<commit_message>
the birds and the crabs
bit of both, im on the board for the former, did a fair bit on the latter. deadline approaching fast for both either way
</commit_message>
<xml_diff>
--- a/BSX2021/Group_proj/Birdpres_theme_test.pptx
+++ b/BSX2021/Group_proj/Birdpres_theme_test.pptx
@@ -116,6 +116,11 @@
       </a:defRPr>
     </a:lvl9pPr>
   </p:defaultTextStyle>
+  <p:extLst>
+    <p:ext uri="{EFAFB233-063F-42B5-8137-9DF3F51BA10A}">
+      <p15:sldGuideLst xmlns:p15="http://schemas.microsoft.com/office/powerpoint/2012/main"/>
+    </p:ext>
+  </p:extLst>
 </p:presentation>
 </file>
 
@@ -250,7 +255,7 @@
           <a:p>
             <a:fld id="{8669A913-3C6C-4BE4-BA6C-395EAE0E10F1}" type="datetimeFigureOut">
               <a:rPr lang="en-GB" smtClean="0"/>
-              <a:t>12/02/2025</a:t>
+              <a:t>16/02/2025</a:t>
             </a:fld>
             <a:endParaRPr lang="en-GB"/>
           </a:p>
@@ -749,9 +754,9 @@
           <a:bodyPr/>
           <a:lstStyle/>
           <a:p>
-            <a:fld id="{D678DCA6-5133-4AD8-BBEB-C5FC1F56D901}" type="datetimeFigureOut">
+            <a:fld id="{441BB22B-5B48-49AE-80A2-D69EB1B9F30A}" type="datetime1">
               <a:rPr lang="en-GB" smtClean="0"/>
-              <a:t>12/02/2025</a:t>
+              <a:t>16/02/2025</a:t>
             </a:fld>
             <a:endParaRPr lang="en-GB"/>
           </a:p>
@@ -778,7 +783,10 @@
           <a:bodyPr/>
           <a:lstStyle/>
           <a:p>
-            <a:endParaRPr lang="en-GB"/>
+            <a:r>
+              <a:rPr lang="en-GB"/>
+              <a:t>SAMPLE TEXT</a:t>
+            </a:r>
           </a:p>
         </p:txBody>
       </p:sp>
@@ -807,7 +815,7 @@
               <a:rPr lang="en-GB" smtClean="0"/>
               <a:t>‹#›</a:t>
             </a:fld>
-            <a:endParaRPr lang="en-GB"/>
+            <a:endParaRPr lang="en-GB" dirty="0"/>
           </a:p>
         </p:txBody>
       </p:sp>
@@ -949,9 +957,9 @@
           <a:bodyPr/>
           <a:lstStyle/>
           <a:p>
-            <a:fld id="{D678DCA6-5133-4AD8-BBEB-C5FC1F56D901}" type="datetimeFigureOut">
+            <a:fld id="{A95D43FE-69E0-40B4-8277-0722653483E0}" type="datetime1">
               <a:rPr lang="en-GB" smtClean="0"/>
-              <a:t>12/02/2025</a:t>
+              <a:t>16/02/2025</a:t>
             </a:fld>
             <a:endParaRPr lang="en-GB"/>
           </a:p>
@@ -978,7 +986,10 @@
           <a:bodyPr/>
           <a:lstStyle/>
           <a:p>
-            <a:endParaRPr lang="en-GB"/>
+            <a:r>
+              <a:rPr lang="en-GB"/>
+              <a:t>SAMPLE TEXT</a:t>
+            </a:r>
           </a:p>
         </p:txBody>
       </p:sp>
@@ -1159,9 +1170,9 @@
           <a:bodyPr/>
           <a:lstStyle/>
           <a:p>
-            <a:fld id="{D678DCA6-5133-4AD8-BBEB-C5FC1F56D901}" type="datetimeFigureOut">
+            <a:fld id="{D071BF1A-198B-4E2B-8705-5165F77384BB}" type="datetime1">
               <a:rPr lang="en-GB" smtClean="0"/>
-              <a:t>12/02/2025</a:t>
+              <a:t>16/02/2025</a:t>
             </a:fld>
             <a:endParaRPr lang="en-GB"/>
           </a:p>
@@ -1188,7 +1199,10 @@
           <a:bodyPr/>
           <a:lstStyle/>
           <a:p>
-            <a:endParaRPr lang="en-GB"/>
+            <a:r>
+              <a:rPr lang="en-GB"/>
+              <a:t>SAMPLE TEXT</a:t>
+            </a:r>
           </a:p>
         </p:txBody>
       </p:sp>
@@ -1359,9 +1373,9 @@
           <a:bodyPr/>
           <a:lstStyle/>
           <a:p>
-            <a:fld id="{D678DCA6-5133-4AD8-BBEB-C5FC1F56D901}" type="datetimeFigureOut">
+            <a:fld id="{C7530781-7069-4C52-9986-F4D7100F7F0E}" type="datetime1">
               <a:rPr lang="en-GB" smtClean="0"/>
-              <a:t>12/02/2025</a:t>
+              <a:t>16/02/2025</a:t>
             </a:fld>
             <a:endParaRPr lang="en-GB"/>
           </a:p>
@@ -1388,7 +1402,10 @@
           <a:bodyPr/>
           <a:lstStyle/>
           <a:p>
-            <a:endParaRPr lang="en-GB"/>
+            <a:r>
+              <a:rPr lang="en-GB"/>
+              <a:t>SAMPLE TEXT</a:t>
+            </a:r>
           </a:p>
         </p:txBody>
       </p:sp>
@@ -1417,7 +1434,7 @@
               <a:rPr lang="en-GB" smtClean="0"/>
               <a:t>‹#›</a:t>
             </a:fld>
-            <a:endParaRPr lang="en-GB"/>
+            <a:endParaRPr lang="en-GB" dirty="0"/>
           </a:p>
         </p:txBody>
       </p:sp>
@@ -1635,9 +1652,9 @@
           <a:bodyPr/>
           <a:lstStyle/>
           <a:p>
-            <a:fld id="{D678DCA6-5133-4AD8-BBEB-C5FC1F56D901}" type="datetimeFigureOut">
+            <a:fld id="{18362A19-9A1F-4D71-9631-1743592D9CF5}" type="datetime1">
               <a:rPr lang="en-GB" smtClean="0"/>
-              <a:t>12/02/2025</a:t>
+              <a:t>16/02/2025</a:t>
             </a:fld>
             <a:endParaRPr lang="en-GB"/>
           </a:p>
@@ -1664,7 +1681,10 @@
           <a:bodyPr/>
           <a:lstStyle/>
           <a:p>
-            <a:endParaRPr lang="en-GB"/>
+            <a:r>
+              <a:rPr lang="en-GB"/>
+              <a:t>SAMPLE TEXT</a:t>
+            </a:r>
           </a:p>
         </p:txBody>
       </p:sp>
@@ -1903,9 +1923,9 @@
           <a:bodyPr/>
           <a:lstStyle/>
           <a:p>
-            <a:fld id="{D678DCA6-5133-4AD8-BBEB-C5FC1F56D901}" type="datetimeFigureOut">
+            <a:fld id="{95F473B8-5AC4-4DB4-BF63-75C77EB95D97}" type="datetime1">
               <a:rPr lang="en-GB" smtClean="0"/>
-              <a:t>12/02/2025</a:t>
+              <a:t>16/02/2025</a:t>
             </a:fld>
             <a:endParaRPr lang="en-GB"/>
           </a:p>
@@ -1932,7 +1952,10 @@
           <a:bodyPr/>
           <a:lstStyle/>
           <a:p>
-            <a:endParaRPr lang="en-GB"/>
+            <a:r>
+              <a:rPr lang="en-GB"/>
+              <a:t>SAMPLE TEXT</a:t>
+            </a:r>
           </a:p>
         </p:txBody>
       </p:sp>
@@ -2318,9 +2341,9 @@
           <a:bodyPr/>
           <a:lstStyle/>
           <a:p>
-            <a:fld id="{D678DCA6-5133-4AD8-BBEB-C5FC1F56D901}" type="datetimeFigureOut">
+            <a:fld id="{254B12B9-2309-4057-B81D-CA46F3B1DD5F}" type="datetime1">
               <a:rPr lang="en-GB" smtClean="0"/>
-              <a:t>12/02/2025</a:t>
+              <a:t>16/02/2025</a:t>
             </a:fld>
             <a:endParaRPr lang="en-GB"/>
           </a:p>
@@ -2347,7 +2370,10 @@
           <a:bodyPr/>
           <a:lstStyle/>
           <a:p>
-            <a:endParaRPr lang="en-GB"/>
+            <a:r>
+              <a:rPr lang="en-GB"/>
+              <a:t>SAMPLE TEXT</a:t>
+            </a:r>
           </a:p>
         </p:txBody>
       </p:sp>
@@ -2460,9 +2486,9 @@
           <a:bodyPr/>
           <a:lstStyle/>
           <a:p>
-            <a:fld id="{D678DCA6-5133-4AD8-BBEB-C5FC1F56D901}" type="datetimeFigureOut">
+            <a:fld id="{F78640F9-3D13-4BC4-83DB-96828BA6AB04}" type="datetime1">
               <a:rPr lang="en-GB" smtClean="0"/>
-              <a:t>12/02/2025</a:t>
+              <a:t>16/02/2025</a:t>
             </a:fld>
             <a:endParaRPr lang="en-GB"/>
           </a:p>
@@ -2489,7 +2515,10 @@
           <a:bodyPr/>
           <a:lstStyle/>
           <a:p>
-            <a:endParaRPr lang="en-GB"/>
+            <a:r>
+              <a:rPr lang="en-GB"/>
+              <a:t>SAMPLE TEXT</a:t>
+            </a:r>
           </a:p>
         </p:txBody>
       </p:sp>
@@ -2573,9 +2602,9 @@
           <a:bodyPr/>
           <a:lstStyle/>
           <a:p>
-            <a:fld id="{D678DCA6-5133-4AD8-BBEB-C5FC1F56D901}" type="datetimeFigureOut">
+            <a:fld id="{B4D19B2E-394C-480C-86ED-9B91ABAD25AC}" type="datetime1">
               <a:rPr lang="en-GB" smtClean="0"/>
-              <a:t>12/02/2025</a:t>
+              <a:t>16/02/2025</a:t>
             </a:fld>
             <a:endParaRPr lang="en-GB"/>
           </a:p>
@@ -2602,7 +2631,10 @@
           <a:bodyPr/>
           <a:lstStyle/>
           <a:p>
-            <a:endParaRPr lang="en-GB"/>
+            <a:r>
+              <a:rPr lang="en-GB"/>
+              <a:t>SAMPLE TEXT</a:t>
+            </a:r>
           </a:p>
         </p:txBody>
       </p:sp>
@@ -2886,9 +2918,9 @@
           <a:bodyPr/>
           <a:lstStyle/>
           <a:p>
-            <a:fld id="{D678DCA6-5133-4AD8-BBEB-C5FC1F56D901}" type="datetimeFigureOut">
+            <a:fld id="{583B7A03-4E2B-4644-8CA7-7F32E17E3A18}" type="datetime1">
               <a:rPr lang="en-GB" smtClean="0"/>
-              <a:t>12/02/2025</a:t>
+              <a:t>16/02/2025</a:t>
             </a:fld>
             <a:endParaRPr lang="en-GB"/>
           </a:p>
@@ -2915,7 +2947,10 @@
           <a:bodyPr/>
           <a:lstStyle/>
           <a:p>
-            <a:endParaRPr lang="en-GB"/>
+            <a:r>
+              <a:rPr lang="en-GB"/>
+              <a:t>SAMPLE TEXT</a:t>
+            </a:r>
           </a:p>
         </p:txBody>
       </p:sp>
@@ -3175,9 +3210,9 @@
           <a:bodyPr/>
           <a:lstStyle/>
           <a:p>
-            <a:fld id="{D678DCA6-5133-4AD8-BBEB-C5FC1F56D901}" type="datetimeFigureOut">
+            <a:fld id="{C36929F3-B695-4E96-ABBD-EDF866E67F58}" type="datetime1">
               <a:rPr lang="en-GB" smtClean="0"/>
-              <a:t>12/02/2025</a:t>
+              <a:t>16/02/2025</a:t>
             </a:fld>
             <a:endParaRPr lang="en-GB"/>
           </a:p>
@@ -3204,7 +3239,10 @@
           <a:bodyPr/>
           <a:lstStyle/>
           <a:p>
-            <a:endParaRPr lang="en-GB"/>
+            <a:r>
+              <a:rPr lang="en-GB"/>
+              <a:t>SAMPLE TEXT</a:t>
+            </a:r>
           </a:p>
         </p:txBody>
       </p:sp>
@@ -3298,23 +3336,27 @@
                 <a:schemeClr val="accent3">
                   <a:lumMod val="60000"/>
                   <a:lumOff val="40000"/>
+                  <a:alpha val="75000"/>
                 </a:schemeClr>
               </a:gs>
               <a:gs pos="100000">
                 <a:schemeClr val="accent5">
                   <a:lumMod val="60000"/>
                   <a:lumOff val="40000"/>
+                  <a:alpha val="75000"/>
                 </a:schemeClr>
               </a:gs>
               <a:gs pos="47000">
                 <a:schemeClr val="accent4">
                   <a:lumMod val="75000"/>
+                  <a:alpha val="85000"/>
                 </a:schemeClr>
               </a:gs>
               <a:gs pos="80000">
                 <a:schemeClr val="accent6">
                   <a:lumMod val="60000"/>
                   <a:lumOff val="40000"/>
+                  <a:alpha val="90000"/>
                 </a:schemeClr>
               </a:gs>
             </a:gsLst>
@@ -3346,7 +3388,7 @@
           <a:lstStyle/>
           <a:p>
             <a:pPr algn="ctr"/>
-            <a:endParaRPr lang="en-GB"/>
+            <a:endParaRPr lang="en-GB" dirty="0"/>
           </a:p>
         </p:txBody>
       </p:sp>
@@ -3496,10 +3538,70 @@
             </a:lvl1pPr>
           </a:lstStyle>
           <a:p>
-            <a:fld id="{D678DCA6-5133-4AD8-BBEB-C5FC1F56D901}" type="datetimeFigureOut">
+            <a:fld id="{DF41F9BA-D93D-4DD6-9C37-6FF4EB5FFAAC}" type="datetime1">
               <a:rPr lang="en-GB" smtClean="0"/>
-              <a:t>12/02/2025</a:t>
+              <a:t>16/02/2025</a:t>
             </a:fld>
+            <a:endParaRPr lang="en-GB"/>
+          </a:p>
+        </p:txBody>
+      </p:sp>
+      <p:sp>
+        <p:nvSpPr>
+          <p:cNvPr id="8" name="Rectangle 7">
+            <a:extLst>
+              <a:ext uri="{FF2B5EF4-FFF2-40B4-BE49-F238E27FC236}">
+                <a16:creationId xmlns:a16="http://schemas.microsoft.com/office/drawing/2014/main" id="{09049983-6753-D429-E420-0F613427551F}"/>
+              </a:ext>
+            </a:extLst>
+          </p:cNvPr>
+          <p:cNvSpPr/>
+          <p:nvPr userDrawn="1"/>
+        </p:nvSpPr>
+        <p:spPr>
+          <a:xfrm>
+            <a:off x="4038600" y="6356350"/>
+            <a:ext cx="4114800" cy="365125"/>
+          </a:xfrm>
+          <a:prstGeom prst="rect">
+            <a:avLst/>
+          </a:prstGeom>
+          <a:solidFill>
+            <a:schemeClr val="accent2">
+              <a:lumMod val="20000"/>
+              <a:lumOff val="80000"/>
+            </a:schemeClr>
+          </a:solidFill>
+          <a:ln>
+            <a:solidFill>
+              <a:schemeClr val="accent1">
+                <a:lumMod val="75000"/>
+                <a:lumOff val="25000"/>
+              </a:schemeClr>
+            </a:solidFill>
+          </a:ln>
+        </p:spPr>
+        <p:style>
+          <a:lnRef idx="2">
+            <a:schemeClr val="accent4">
+              <a:shade val="15000"/>
+            </a:schemeClr>
+          </a:lnRef>
+          <a:fillRef idx="1">
+            <a:schemeClr val="accent4"/>
+          </a:fillRef>
+          <a:effectRef idx="0">
+            <a:schemeClr val="accent4"/>
+          </a:effectRef>
+          <a:fontRef idx="minor">
+            <a:schemeClr val="lt1"/>
+          </a:fontRef>
+        </p:style>
+        <p:txBody>
+          <a:bodyPr rtlCol="0" anchor="ctr"/>
+          <a:lstStyle/>
+          <a:p>
+            <a:pPr algn="ctr"/>
             <a:endParaRPr lang="en-GB"/>
           </a:p>
         </p:txBody>
@@ -3543,30 +3645,93 @@
             </a:lvl1pPr>
           </a:lstStyle>
           <a:p>
-            <a:endParaRPr lang="en-GB"/>
-          </a:p>
-        </p:txBody>
-      </p:sp>
-      <p:sp>
-        <p:nvSpPr>
-          <p:cNvPr id="6" name="Slide Number Placeholder 5">
-            <a:extLst>
-              <a:ext uri="{FF2B5EF4-FFF2-40B4-BE49-F238E27FC236}">
-                <a16:creationId xmlns:a16="http://schemas.microsoft.com/office/drawing/2014/main" id="{B2B93926-D1F9-A3E2-46C1-F073BDA6F808}"/>
-              </a:ext>
-            </a:extLst>
-          </p:cNvPr>
-          <p:cNvSpPr>
-            <a:spLocks noGrp="1"/>
-          </p:cNvSpPr>
-          <p:nvPr>
-            <p:ph type="sldNum" sz="quarter" idx="4"/>
-          </p:nvPr>
+            <a:r>
+              <a:rPr lang="en-GB"/>
+              <a:t>SAMPLE TEXT</a:t>
+            </a:r>
+          </a:p>
+        </p:txBody>
+      </p:sp>
+      <p:sp>
+        <p:nvSpPr>
+          <p:cNvPr id="10" name="Rectangle 9">
+            <a:extLst>
+              <a:ext uri="{FF2B5EF4-FFF2-40B4-BE49-F238E27FC236}">
+                <a16:creationId xmlns:a16="http://schemas.microsoft.com/office/drawing/2014/main" id="{4C49AA7B-D4B3-B0DB-0AB3-1B8B18EA2822}"/>
+              </a:ext>
+            </a:extLst>
+          </p:cNvPr>
+          <p:cNvSpPr/>
+          <p:nvPr userDrawn="1"/>
         </p:nvSpPr>
         <p:spPr>
           <a:xfrm>
-            <a:off x="8610600" y="6356350"/>
-            <a:ext cx="2743200" cy="365125"/>
+            <a:off x="10972798" y="6356350"/>
+            <a:ext cx="381001" cy="365125"/>
+          </a:xfrm>
+          <a:prstGeom prst="rect">
+            <a:avLst/>
+          </a:prstGeom>
+          <a:solidFill>
+            <a:schemeClr val="accent1">
+              <a:lumMod val="75000"/>
+              <a:lumOff val="25000"/>
+            </a:schemeClr>
+          </a:solidFill>
+          <a:ln>
+            <a:solidFill>
+              <a:schemeClr val="accent6">
+                <a:lumMod val="40000"/>
+                <a:lumOff val="60000"/>
+              </a:schemeClr>
+            </a:solidFill>
+          </a:ln>
+        </p:spPr>
+        <p:style>
+          <a:lnRef idx="2">
+            <a:schemeClr val="accent1">
+              <a:shade val="15000"/>
+            </a:schemeClr>
+          </a:lnRef>
+          <a:fillRef idx="1">
+            <a:schemeClr val="accent1"/>
+          </a:fillRef>
+          <a:effectRef idx="0">
+            <a:schemeClr val="accent1"/>
+          </a:effectRef>
+          <a:fontRef idx="minor">
+            <a:schemeClr val="lt1"/>
+          </a:fontRef>
+        </p:style>
+        <p:txBody>
+          <a:bodyPr rtlCol="0" anchor="ctr"/>
+          <a:lstStyle/>
+          <a:p>
+            <a:pPr algn="ctr"/>
+            <a:endParaRPr lang="en-GB" dirty="0"/>
+          </a:p>
+        </p:txBody>
+      </p:sp>
+      <p:sp>
+        <p:nvSpPr>
+          <p:cNvPr id="6" name="Slide Number Placeholder 5">
+            <a:extLst>
+              <a:ext uri="{FF2B5EF4-FFF2-40B4-BE49-F238E27FC236}">
+                <a16:creationId xmlns:a16="http://schemas.microsoft.com/office/drawing/2014/main" id="{B2B93926-D1F9-A3E2-46C1-F073BDA6F808}"/>
+              </a:ext>
+            </a:extLst>
+          </p:cNvPr>
+          <p:cNvSpPr>
+            <a:spLocks noGrp="1"/>
+          </p:cNvSpPr>
+          <p:nvPr>
+            <p:ph type="sldNum" sz="quarter" idx="4"/>
+          </p:nvPr>
+        </p:nvSpPr>
+        <p:spPr>
+          <a:xfrm>
+            <a:off x="10863618" y="6356350"/>
+            <a:ext cx="490182" cy="365125"/>
           </a:xfrm>
           <a:prstGeom prst="rect">
             <a:avLst/>
@@ -3578,19 +3743,16 @@
             <a:lvl1pPr algn="r">
               <a:defRPr sz="1200">
                 <a:solidFill>
-                  <a:schemeClr val="tx1">
-                    <a:tint val="82000"/>
-                  </a:schemeClr>
+                  <a:schemeClr val="accent3"/>
                 </a:solidFill>
               </a:defRPr>
             </a:lvl1pPr>
           </a:lstStyle>
           <a:p>
-            <a:fld id="{B6DECC64-88C5-4A52-8D83-04DEBC6BB575}" type="slidenum">
-              <a:rPr lang="en-GB" smtClean="0"/>
-              <a:t>‹#›</a:t>
-            </a:fld>
-            <a:endParaRPr lang="en-GB"/>
+            <a:r>
+              <a:rPr lang="en-GB" dirty="0"/>
+              <a:t>&lt;#&gt;</a:t>
+            </a:r>
           </a:p>
         </p:txBody>
       </p:sp>
@@ -3615,6 +3777,7 @@
     <p:sldLayoutId id="2147483658" r:id="rId10"/>
     <p:sldLayoutId id="2147483659" r:id="rId11"/>
   </p:sldLayoutIdLst>
+  <p:hf hdr="0" dt="0"/>
   <p:txStyles>
     <p:titleStyle>
       <a:lvl1pPr algn="l" defTabSz="914400" rtl="0" eaLnBrk="1" latinLnBrk="0" hangingPunct="1">
@@ -4020,7 +4183,7 @@
         </p:blipFill>
         <p:spPr>
           <a:xfrm>
-            <a:off x="2773680" y="0"/>
+            <a:off x="2806337" y="0"/>
             <a:ext cx="9418320" cy="6858000"/>
           </a:xfrm>
           <a:prstGeom prst="rect">
@@ -4121,7 +4284,7 @@
         </p:nvSpPr>
         <p:spPr>
           <a:xfrm>
-            <a:off x="1524000" y="5551714"/>
+            <a:off x="1524000" y="5060391"/>
             <a:ext cx="9144000" cy="1267093"/>
           </a:xfrm>
         </p:spPr>
@@ -4227,6 +4390,63 @@
               <a:t>RSPB website</a:t>
             </a:r>
             <a:endParaRPr lang="en-GB" dirty="0"/>
+          </a:p>
+        </p:txBody>
+      </p:sp>
+      <p:sp>
+        <p:nvSpPr>
+          <p:cNvPr id="4" name="Footer Placeholder 3">
+            <a:extLst>
+              <a:ext uri="{FF2B5EF4-FFF2-40B4-BE49-F238E27FC236}">
+                <a16:creationId xmlns:a16="http://schemas.microsoft.com/office/drawing/2014/main" id="{B68BA9E7-B9C4-B239-BCA3-3E58FFC0A147}"/>
+              </a:ext>
+            </a:extLst>
+          </p:cNvPr>
+          <p:cNvSpPr>
+            <a:spLocks noGrp="1"/>
+          </p:cNvSpPr>
+          <p:nvPr>
+            <p:ph type="ftr" sz="quarter" idx="11"/>
+          </p:nvPr>
+        </p:nvSpPr>
+        <p:spPr/>
+        <p:txBody>
+          <a:bodyPr/>
+          <a:lstStyle/>
+          <a:p>
+            <a:r>
+              <a:rPr lang="en-GB" dirty="0"/>
+              <a:t>SAMPLE TEXT</a:t>
+            </a:r>
+          </a:p>
+        </p:txBody>
+      </p:sp>
+      <p:sp>
+        <p:nvSpPr>
+          <p:cNvPr id="5" name="Slide Number Placeholder 4">
+            <a:extLst>
+              <a:ext uri="{FF2B5EF4-FFF2-40B4-BE49-F238E27FC236}">
+                <a16:creationId xmlns:a16="http://schemas.microsoft.com/office/drawing/2014/main" id="{84A01BE7-B2C4-DCAB-119E-0BE3BAC2FFDD}"/>
+              </a:ext>
+            </a:extLst>
+          </p:cNvPr>
+          <p:cNvSpPr>
+            <a:spLocks noGrp="1"/>
+          </p:cNvSpPr>
+          <p:nvPr>
+            <p:ph type="sldNum" sz="quarter" idx="12"/>
+          </p:nvPr>
+        </p:nvSpPr>
+        <p:spPr/>
+        <p:txBody>
+          <a:bodyPr/>
+          <a:lstStyle/>
+          <a:p>
+            <a:fld id="{B6DECC64-88C5-4A52-8D83-04DEBC6BB575}" type="slidenum">
+              <a:rPr lang="en-GB" smtClean="0"/>
+              <a:t>1</a:t>
+            </a:fld>
+            <a:endParaRPr lang="en-GB"/>
           </a:p>
         </p:txBody>
       </p:sp>
@@ -4346,6 +4566,63 @@
           </a:p>
         </p:txBody>
       </p:sp>
+      <p:sp>
+        <p:nvSpPr>
+          <p:cNvPr id="4" name="Footer Placeholder 3">
+            <a:extLst>
+              <a:ext uri="{FF2B5EF4-FFF2-40B4-BE49-F238E27FC236}">
+                <a16:creationId xmlns:a16="http://schemas.microsoft.com/office/drawing/2014/main" id="{C130F5B2-54E4-6859-8042-3F434A766DB8}"/>
+              </a:ext>
+            </a:extLst>
+          </p:cNvPr>
+          <p:cNvSpPr>
+            <a:spLocks noGrp="1"/>
+          </p:cNvSpPr>
+          <p:nvPr>
+            <p:ph type="ftr" sz="quarter" idx="11"/>
+          </p:nvPr>
+        </p:nvSpPr>
+        <p:spPr/>
+        <p:txBody>
+          <a:bodyPr/>
+          <a:lstStyle/>
+          <a:p>
+            <a:r>
+              <a:rPr lang="en-GB"/>
+              <a:t>SAMPLE TEXT</a:t>
+            </a:r>
+          </a:p>
+        </p:txBody>
+      </p:sp>
+      <p:sp>
+        <p:nvSpPr>
+          <p:cNvPr id="5" name="Slide Number Placeholder 4">
+            <a:extLst>
+              <a:ext uri="{FF2B5EF4-FFF2-40B4-BE49-F238E27FC236}">
+                <a16:creationId xmlns:a16="http://schemas.microsoft.com/office/drawing/2014/main" id="{8B3DED65-5161-9330-57E9-16594B04D279}"/>
+              </a:ext>
+            </a:extLst>
+          </p:cNvPr>
+          <p:cNvSpPr>
+            <a:spLocks noGrp="1"/>
+          </p:cNvSpPr>
+          <p:nvPr>
+            <p:ph type="sldNum" sz="quarter" idx="12"/>
+          </p:nvPr>
+        </p:nvSpPr>
+        <p:spPr/>
+        <p:txBody>
+          <a:bodyPr/>
+          <a:lstStyle/>
+          <a:p>
+            <a:fld id="{B6DECC64-88C5-4A52-8D83-04DEBC6BB575}" type="slidenum">
+              <a:rPr lang="en-GB" smtClean="0"/>
+              <a:t>10</a:t>
+            </a:fld>
+            <a:endParaRPr lang="en-GB"/>
+          </a:p>
+        </p:txBody>
+      </p:sp>
     </p:spTree>
     <p:extLst>
       <p:ext uri="{BB962C8B-B14F-4D97-AF65-F5344CB8AC3E}">
@@ -4525,6 +4802,63 @@
               <a:rPr lang="en-GB" dirty="0"/>
               <a:t>ID leaflet?</a:t>
             </a:r>
+          </a:p>
+        </p:txBody>
+      </p:sp>
+      <p:sp>
+        <p:nvSpPr>
+          <p:cNvPr id="5" name="Footer Placeholder 4">
+            <a:extLst>
+              <a:ext uri="{FF2B5EF4-FFF2-40B4-BE49-F238E27FC236}">
+                <a16:creationId xmlns:a16="http://schemas.microsoft.com/office/drawing/2014/main" id="{8A05582E-628B-69FE-C1E7-8D9DEBE6BA87}"/>
+              </a:ext>
+            </a:extLst>
+          </p:cNvPr>
+          <p:cNvSpPr>
+            <a:spLocks noGrp="1"/>
+          </p:cNvSpPr>
+          <p:nvPr>
+            <p:ph type="ftr" sz="quarter" idx="11"/>
+          </p:nvPr>
+        </p:nvSpPr>
+        <p:spPr/>
+        <p:txBody>
+          <a:bodyPr/>
+          <a:lstStyle/>
+          <a:p>
+            <a:r>
+              <a:rPr lang="en-GB"/>
+              <a:t>SAMPLE TEXT</a:t>
+            </a:r>
+          </a:p>
+        </p:txBody>
+      </p:sp>
+      <p:sp>
+        <p:nvSpPr>
+          <p:cNvPr id="6" name="Slide Number Placeholder 5">
+            <a:extLst>
+              <a:ext uri="{FF2B5EF4-FFF2-40B4-BE49-F238E27FC236}">
+                <a16:creationId xmlns:a16="http://schemas.microsoft.com/office/drawing/2014/main" id="{03B94DD9-A542-0741-A71B-9A46E039BA98}"/>
+              </a:ext>
+            </a:extLst>
+          </p:cNvPr>
+          <p:cNvSpPr>
+            <a:spLocks noGrp="1"/>
+          </p:cNvSpPr>
+          <p:nvPr>
+            <p:ph type="sldNum" sz="quarter" idx="12"/>
+          </p:nvPr>
+        </p:nvSpPr>
+        <p:spPr/>
+        <p:txBody>
+          <a:bodyPr/>
+          <a:lstStyle/>
+          <a:p>
+            <a:fld id="{B6DECC64-88C5-4A52-8D83-04DEBC6BB575}" type="slidenum">
+              <a:rPr lang="en-GB" smtClean="0"/>
+              <a:t>2</a:t>
+            </a:fld>
+            <a:endParaRPr lang="en-GB"/>
           </a:p>
         </p:txBody>
       </p:sp>
@@ -4640,6 +4974,63 @@
           </a:p>
         </p:txBody>
       </p:sp>
+      <p:sp>
+        <p:nvSpPr>
+          <p:cNvPr id="4" name="Footer Placeholder 3">
+            <a:extLst>
+              <a:ext uri="{FF2B5EF4-FFF2-40B4-BE49-F238E27FC236}">
+                <a16:creationId xmlns:a16="http://schemas.microsoft.com/office/drawing/2014/main" id="{FE11DD38-BE42-99C8-A5EB-52817368A2F4}"/>
+              </a:ext>
+            </a:extLst>
+          </p:cNvPr>
+          <p:cNvSpPr>
+            <a:spLocks noGrp="1"/>
+          </p:cNvSpPr>
+          <p:nvPr>
+            <p:ph type="ftr" sz="quarter" idx="11"/>
+          </p:nvPr>
+        </p:nvSpPr>
+        <p:spPr/>
+        <p:txBody>
+          <a:bodyPr/>
+          <a:lstStyle/>
+          <a:p>
+            <a:r>
+              <a:rPr lang="en-GB" dirty="0"/>
+              <a:t>SAMPLE TEXT</a:t>
+            </a:r>
+          </a:p>
+        </p:txBody>
+      </p:sp>
+      <p:sp>
+        <p:nvSpPr>
+          <p:cNvPr id="5" name="Slide Number Placeholder 4">
+            <a:extLst>
+              <a:ext uri="{FF2B5EF4-FFF2-40B4-BE49-F238E27FC236}">
+                <a16:creationId xmlns:a16="http://schemas.microsoft.com/office/drawing/2014/main" id="{4709DC21-5C6A-7334-A187-7BDF8355EC56}"/>
+              </a:ext>
+            </a:extLst>
+          </p:cNvPr>
+          <p:cNvSpPr>
+            <a:spLocks noGrp="1"/>
+          </p:cNvSpPr>
+          <p:nvPr>
+            <p:ph type="sldNum" sz="quarter" idx="12"/>
+          </p:nvPr>
+        </p:nvSpPr>
+        <p:spPr/>
+        <p:txBody>
+          <a:bodyPr/>
+          <a:lstStyle/>
+          <a:p>
+            <a:fld id="{B6DECC64-88C5-4A52-8D83-04DEBC6BB575}" type="slidenum">
+              <a:rPr lang="en-GB" smtClean="0"/>
+              <a:t>3</a:t>
+            </a:fld>
+            <a:endParaRPr lang="en-GB"/>
+          </a:p>
+        </p:txBody>
+      </p:sp>
     </p:spTree>
     <p:extLst>
       <p:ext uri="{BB962C8B-B14F-4D97-AF65-F5344CB8AC3E}">
@@ -4833,6 +5224,63 @@
           </a:p>
         </p:txBody>
       </p:sp>
+      <p:sp>
+        <p:nvSpPr>
+          <p:cNvPr id="5" name="Footer Placeholder 4">
+            <a:extLst>
+              <a:ext uri="{FF2B5EF4-FFF2-40B4-BE49-F238E27FC236}">
+                <a16:creationId xmlns:a16="http://schemas.microsoft.com/office/drawing/2014/main" id="{0E567B9D-7B2D-B663-71CD-51F76BFEE787}"/>
+              </a:ext>
+            </a:extLst>
+          </p:cNvPr>
+          <p:cNvSpPr>
+            <a:spLocks noGrp="1"/>
+          </p:cNvSpPr>
+          <p:nvPr>
+            <p:ph type="ftr" sz="quarter" idx="11"/>
+          </p:nvPr>
+        </p:nvSpPr>
+        <p:spPr/>
+        <p:txBody>
+          <a:bodyPr/>
+          <a:lstStyle/>
+          <a:p>
+            <a:r>
+              <a:rPr lang="en-GB"/>
+              <a:t>SAMPLE TEXT</a:t>
+            </a:r>
+          </a:p>
+        </p:txBody>
+      </p:sp>
+      <p:sp>
+        <p:nvSpPr>
+          <p:cNvPr id="6" name="Slide Number Placeholder 5">
+            <a:extLst>
+              <a:ext uri="{FF2B5EF4-FFF2-40B4-BE49-F238E27FC236}">
+                <a16:creationId xmlns:a16="http://schemas.microsoft.com/office/drawing/2014/main" id="{7D20A191-29E4-0085-0E4E-1E6F928213AA}"/>
+              </a:ext>
+            </a:extLst>
+          </p:cNvPr>
+          <p:cNvSpPr>
+            <a:spLocks noGrp="1"/>
+          </p:cNvSpPr>
+          <p:nvPr>
+            <p:ph type="sldNum" sz="quarter" idx="12"/>
+          </p:nvPr>
+        </p:nvSpPr>
+        <p:spPr/>
+        <p:txBody>
+          <a:bodyPr/>
+          <a:lstStyle/>
+          <a:p>
+            <a:fld id="{B6DECC64-88C5-4A52-8D83-04DEBC6BB575}" type="slidenum">
+              <a:rPr lang="en-GB" smtClean="0"/>
+              <a:t>4</a:t>
+            </a:fld>
+            <a:endParaRPr lang="en-GB"/>
+          </a:p>
+        </p:txBody>
+      </p:sp>
     </p:spTree>
     <p:extLst>
       <p:ext uri="{BB962C8B-B14F-4D97-AF65-F5344CB8AC3E}">
@@ -5026,6 +5474,63 @@
               <a:rPr lang="en-GB" dirty="0"/>
               <a:t> hear</a:t>
             </a:r>
+          </a:p>
+        </p:txBody>
+      </p:sp>
+      <p:sp>
+        <p:nvSpPr>
+          <p:cNvPr id="5" name="Footer Placeholder 4">
+            <a:extLst>
+              <a:ext uri="{FF2B5EF4-FFF2-40B4-BE49-F238E27FC236}">
+                <a16:creationId xmlns:a16="http://schemas.microsoft.com/office/drawing/2014/main" id="{B8E9CED4-E78E-51DC-5013-11F39FA55CF9}"/>
+              </a:ext>
+            </a:extLst>
+          </p:cNvPr>
+          <p:cNvSpPr>
+            <a:spLocks noGrp="1"/>
+          </p:cNvSpPr>
+          <p:nvPr>
+            <p:ph type="ftr" sz="quarter" idx="11"/>
+          </p:nvPr>
+        </p:nvSpPr>
+        <p:spPr/>
+        <p:txBody>
+          <a:bodyPr/>
+          <a:lstStyle/>
+          <a:p>
+            <a:r>
+              <a:rPr lang="en-GB"/>
+              <a:t>SAMPLE TEXT</a:t>
+            </a:r>
+          </a:p>
+        </p:txBody>
+      </p:sp>
+      <p:sp>
+        <p:nvSpPr>
+          <p:cNvPr id="6" name="Slide Number Placeholder 5">
+            <a:extLst>
+              <a:ext uri="{FF2B5EF4-FFF2-40B4-BE49-F238E27FC236}">
+                <a16:creationId xmlns:a16="http://schemas.microsoft.com/office/drawing/2014/main" id="{04BB71F7-0F8A-FFF2-2D79-D3BFA5A62080}"/>
+              </a:ext>
+            </a:extLst>
+          </p:cNvPr>
+          <p:cNvSpPr>
+            <a:spLocks noGrp="1"/>
+          </p:cNvSpPr>
+          <p:nvPr>
+            <p:ph type="sldNum" sz="quarter" idx="12"/>
+          </p:nvPr>
+        </p:nvSpPr>
+        <p:spPr/>
+        <p:txBody>
+          <a:bodyPr/>
+          <a:lstStyle/>
+          <a:p>
+            <a:fld id="{B6DECC64-88C5-4A52-8D83-04DEBC6BB575}" type="slidenum">
+              <a:rPr lang="en-GB" smtClean="0"/>
+              <a:t>5</a:t>
+            </a:fld>
+            <a:endParaRPr lang="en-GB"/>
           </a:p>
         </p:txBody>
       </p:sp>
@@ -5584,6 +6089,63 @@
           </a:p>
         </p:txBody>
       </p:sp>
+      <p:sp>
+        <p:nvSpPr>
+          <p:cNvPr id="4" name="Footer Placeholder 3">
+            <a:extLst>
+              <a:ext uri="{FF2B5EF4-FFF2-40B4-BE49-F238E27FC236}">
+                <a16:creationId xmlns:a16="http://schemas.microsoft.com/office/drawing/2014/main" id="{26E0F0FD-FFF5-1FA8-D236-24DAA64EE1D5}"/>
+              </a:ext>
+            </a:extLst>
+          </p:cNvPr>
+          <p:cNvSpPr>
+            <a:spLocks noGrp="1"/>
+          </p:cNvSpPr>
+          <p:nvPr>
+            <p:ph type="ftr" sz="quarter" idx="11"/>
+          </p:nvPr>
+        </p:nvSpPr>
+        <p:spPr/>
+        <p:txBody>
+          <a:bodyPr/>
+          <a:lstStyle/>
+          <a:p>
+            <a:r>
+              <a:rPr lang="en-GB"/>
+              <a:t>SAMPLE TEXT</a:t>
+            </a:r>
+          </a:p>
+        </p:txBody>
+      </p:sp>
+      <p:sp>
+        <p:nvSpPr>
+          <p:cNvPr id="7" name="Slide Number Placeholder 6">
+            <a:extLst>
+              <a:ext uri="{FF2B5EF4-FFF2-40B4-BE49-F238E27FC236}">
+                <a16:creationId xmlns:a16="http://schemas.microsoft.com/office/drawing/2014/main" id="{F9CECF3E-C7FF-1C5E-A1E9-112BCFD8263A}"/>
+              </a:ext>
+            </a:extLst>
+          </p:cNvPr>
+          <p:cNvSpPr>
+            <a:spLocks noGrp="1"/>
+          </p:cNvSpPr>
+          <p:nvPr>
+            <p:ph type="sldNum" sz="quarter" idx="12"/>
+          </p:nvPr>
+        </p:nvSpPr>
+        <p:spPr/>
+        <p:txBody>
+          <a:bodyPr/>
+          <a:lstStyle/>
+          <a:p>
+            <a:fld id="{B6DECC64-88C5-4A52-8D83-04DEBC6BB575}" type="slidenum">
+              <a:rPr lang="en-GB" smtClean="0"/>
+              <a:t>6</a:t>
+            </a:fld>
+            <a:endParaRPr lang="en-GB"/>
+          </a:p>
+        </p:txBody>
+      </p:sp>
     </p:spTree>
     <p:extLst>
       <p:ext uri="{BB962C8B-B14F-4D97-AF65-F5344CB8AC3E}">
@@ -5689,6 +6251,63 @@
           </a:p>
         </p:txBody>
       </p:sp>
+      <p:sp>
+        <p:nvSpPr>
+          <p:cNvPr id="4" name="Footer Placeholder 3">
+            <a:extLst>
+              <a:ext uri="{FF2B5EF4-FFF2-40B4-BE49-F238E27FC236}">
+                <a16:creationId xmlns:a16="http://schemas.microsoft.com/office/drawing/2014/main" id="{20CDCF60-BB62-D385-B4E1-3F3B51C94DBB}"/>
+              </a:ext>
+            </a:extLst>
+          </p:cNvPr>
+          <p:cNvSpPr>
+            <a:spLocks noGrp="1"/>
+          </p:cNvSpPr>
+          <p:nvPr>
+            <p:ph type="ftr" sz="quarter" idx="11"/>
+          </p:nvPr>
+        </p:nvSpPr>
+        <p:spPr/>
+        <p:txBody>
+          <a:bodyPr/>
+          <a:lstStyle/>
+          <a:p>
+            <a:r>
+              <a:rPr lang="en-GB"/>
+              <a:t>SAMPLE TEXT</a:t>
+            </a:r>
+          </a:p>
+        </p:txBody>
+      </p:sp>
+      <p:sp>
+        <p:nvSpPr>
+          <p:cNvPr id="5" name="Slide Number Placeholder 4">
+            <a:extLst>
+              <a:ext uri="{FF2B5EF4-FFF2-40B4-BE49-F238E27FC236}">
+                <a16:creationId xmlns:a16="http://schemas.microsoft.com/office/drawing/2014/main" id="{F619AB6A-E183-4B9D-7FEE-800EF5B948B7}"/>
+              </a:ext>
+            </a:extLst>
+          </p:cNvPr>
+          <p:cNvSpPr>
+            <a:spLocks noGrp="1"/>
+          </p:cNvSpPr>
+          <p:nvPr>
+            <p:ph type="sldNum" sz="quarter" idx="12"/>
+          </p:nvPr>
+        </p:nvSpPr>
+        <p:spPr/>
+        <p:txBody>
+          <a:bodyPr/>
+          <a:lstStyle/>
+          <a:p>
+            <a:fld id="{B6DECC64-88C5-4A52-8D83-04DEBC6BB575}" type="slidenum">
+              <a:rPr lang="en-GB" smtClean="0"/>
+              <a:t>7</a:t>
+            </a:fld>
+            <a:endParaRPr lang="en-GB"/>
+          </a:p>
+        </p:txBody>
+      </p:sp>
     </p:spTree>
     <p:extLst>
       <p:ext uri="{BB962C8B-B14F-4D97-AF65-F5344CB8AC3E}">
@@ -5845,6 +6464,63 @@
           </a:p>
         </p:txBody>
       </p:sp>
+      <p:sp>
+        <p:nvSpPr>
+          <p:cNvPr id="5" name="Footer Placeholder 4">
+            <a:extLst>
+              <a:ext uri="{FF2B5EF4-FFF2-40B4-BE49-F238E27FC236}">
+                <a16:creationId xmlns:a16="http://schemas.microsoft.com/office/drawing/2014/main" id="{654E02DD-41C7-75CC-9753-76D1AE031B6C}"/>
+              </a:ext>
+            </a:extLst>
+          </p:cNvPr>
+          <p:cNvSpPr>
+            <a:spLocks noGrp="1"/>
+          </p:cNvSpPr>
+          <p:nvPr>
+            <p:ph type="ftr" sz="quarter" idx="11"/>
+          </p:nvPr>
+        </p:nvSpPr>
+        <p:spPr/>
+        <p:txBody>
+          <a:bodyPr/>
+          <a:lstStyle/>
+          <a:p>
+            <a:r>
+              <a:rPr lang="en-GB"/>
+              <a:t>SAMPLE TEXT</a:t>
+            </a:r>
+          </a:p>
+        </p:txBody>
+      </p:sp>
+      <p:sp>
+        <p:nvSpPr>
+          <p:cNvPr id="6" name="Slide Number Placeholder 5">
+            <a:extLst>
+              <a:ext uri="{FF2B5EF4-FFF2-40B4-BE49-F238E27FC236}">
+                <a16:creationId xmlns:a16="http://schemas.microsoft.com/office/drawing/2014/main" id="{47B27E92-81AC-6E87-6116-4D754E2166CE}"/>
+              </a:ext>
+            </a:extLst>
+          </p:cNvPr>
+          <p:cNvSpPr>
+            <a:spLocks noGrp="1"/>
+          </p:cNvSpPr>
+          <p:nvPr>
+            <p:ph type="sldNum" sz="quarter" idx="12"/>
+          </p:nvPr>
+        </p:nvSpPr>
+        <p:spPr/>
+        <p:txBody>
+          <a:bodyPr/>
+          <a:lstStyle/>
+          <a:p>
+            <a:fld id="{B6DECC64-88C5-4A52-8D83-04DEBC6BB575}" type="slidenum">
+              <a:rPr lang="en-GB" smtClean="0"/>
+              <a:t>8</a:t>
+            </a:fld>
+            <a:endParaRPr lang="en-GB"/>
+          </a:p>
+        </p:txBody>
+      </p:sp>
     </p:spTree>
     <p:extLst>
       <p:ext uri="{BB962C8B-B14F-4D97-AF65-F5344CB8AC3E}">
@@ -5938,6 +6614,63 @@
               <a:t>{?} </a:t>
             </a:r>
             <a:endParaRPr lang="en-GB" dirty="0"/>
+          </a:p>
+        </p:txBody>
+      </p:sp>
+      <p:sp>
+        <p:nvSpPr>
+          <p:cNvPr id="4" name="Footer Placeholder 3">
+            <a:extLst>
+              <a:ext uri="{FF2B5EF4-FFF2-40B4-BE49-F238E27FC236}">
+                <a16:creationId xmlns:a16="http://schemas.microsoft.com/office/drawing/2014/main" id="{E99D3D22-1051-686E-7119-7570BD147AB2}"/>
+              </a:ext>
+            </a:extLst>
+          </p:cNvPr>
+          <p:cNvSpPr>
+            <a:spLocks noGrp="1"/>
+          </p:cNvSpPr>
+          <p:nvPr>
+            <p:ph type="ftr" sz="quarter" idx="11"/>
+          </p:nvPr>
+        </p:nvSpPr>
+        <p:spPr/>
+        <p:txBody>
+          <a:bodyPr/>
+          <a:lstStyle/>
+          <a:p>
+            <a:r>
+              <a:rPr lang="en-GB"/>
+              <a:t>SAMPLE TEXT</a:t>
+            </a:r>
+          </a:p>
+        </p:txBody>
+      </p:sp>
+      <p:sp>
+        <p:nvSpPr>
+          <p:cNvPr id="5" name="Slide Number Placeholder 4">
+            <a:extLst>
+              <a:ext uri="{FF2B5EF4-FFF2-40B4-BE49-F238E27FC236}">
+                <a16:creationId xmlns:a16="http://schemas.microsoft.com/office/drawing/2014/main" id="{C37FE187-759D-C4EA-B0EE-B87B904E4B37}"/>
+              </a:ext>
+            </a:extLst>
+          </p:cNvPr>
+          <p:cNvSpPr>
+            <a:spLocks noGrp="1"/>
+          </p:cNvSpPr>
+          <p:nvPr>
+            <p:ph type="sldNum" sz="quarter" idx="12"/>
+          </p:nvPr>
+        </p:nvSpPr>
+        <p:spPr/>
+        <p:txBody>
+          <a:bodyPr/>
+          <a:lstStyle/>
+          <a:p>
+            <a:fld id="{B6DECC64-88C5-4A52-8D83-04DEBC6BB575}" type="slidenum">
+              <a:rPr lang="en-GB" smtClean="0"/>
+              <a:t>9</a:t>
+            </a:fld>
+            <a:endParaRPr lang="en-GB"/>
           </a:p>
         </p:txBody>
       </p:sp>

</xml_diff>

<commit_message>
bit a crab, bit a bird, bit a frog
</commit_message>
<xml_diff>
--- a/BSX2021/Group_proj/Birdpres_theme_test.pptx
+++ b/BSX2021/Group_proj/Birdpres_theme_test.pptx
@@ -155,7 +155,7 @@
       <pc:sldMk xmlns:pc="http://schemas.microsoft.com/office/powerpoint/2013/main/command" cId="2699789924" sldId="258"/>
       <ac:spMk id="3" creationId="{5780D55C-FDF1-FF9B-7A94-BAD145D9FCBD}"/>
       <ac:txMk cp="135">
-        <ac:context len="220" hash="2376605095"/>
+        <ac:context len="221" hash="2081161242"/>
       </ac:txMk>
     </ac:txMkLst>
     <p188:pos x="3337112" y="588122"/>
@@ -754,9 +754,9 @@
           <a:bodyPr/>
           <a:lstStyle/>
           <a:p>
-            <a:fld id="{441BB22B-5B48-49AE-80A2-D69EB1B9F30A}" type="datetime1">
+            <a:fld id="{446CC0BC-C602-4AEE-A3AD-090D0BECF5B3}" type="datetime1">
               <a:rPr lang="en-GB" smtClean="0"/>
-              <a:t>16/02/2025</a:t>
+              <a:t>18/02/2025</a:t>
             </a:fld>
             <a:endParaRPr lang="en-GB"/>
           </a:p>
@@ -778,7 +778,15 @@
             <p:ph type="ftr" sz="quarter" idx="11"/>
           </p:nvPr>
         </p:nvSpPr>
-        <p:spPr/>
+        <p:spPr>
+          <a:xfrm>
+            <a:off x="4038600" y="6356350"/>
+            <a:ext cx="4114800" cy="365125"/>
+          </a:xfrm>
+          <a:prstGeom prst="rect">
+            <a:avLst/>
+          </a:prstGeom>
+        </p:spPr>
         <p:txBody>
           <a:bodyPr/>
           <a:lstStyle/>
@@ -957,9 +965,9 @@
           <a:bodyPr/>
           <a:lstStyle/>
           <a:p>
-            <a:fld id="{A95D43FE-69E0-40B4-8277-0722653483E0}" type="datetime1">
+            <a:fld id="{947D41F3-6D50-46C4-841B-A4BE88300823}" type="datetime1">
               <a:rPr lang="en-GB" smtClean="0"/>
-              <a:t>16/02/2025</a:t>
+              <a:t>18/02/2025</a:t>
             </a:fld>
             <a:endParaRPr lang="en-GB"/>
           </a:p>
@@ -981,7 +989,15 @@
             <p:ph type="ftr" sz="quarter" idx="11"/>
           </p:nvPr>
         </p:nvSpPr>
-        <p:spPr/>
+        <p:spPr>
+          <a:xfrm>
+            <a:off x="4038600" y="6356350"/>
+            <a:ext cx="4114800" cy="365125"/>
+          </a:xfrm>
+          <a:prstGeom prst="rect">
+            <a:avLst/>
+          </a:prstGeom>
+        </p:spPr>
         <p:txBody>
           <a:bodyPr/>
           <a:lstStyle/>
@@ -1170,9 +1186,9 @@
           <a:bodyPr/>
           <a:lstStyle/>
           <a:p>
-            <a:fld id="{D071BF1A-198B-4E2B-8705-5165F77384BB}" type="datetime1">
+            <a:fld id="{D18462A7-2F19-44C1-9987-795472FDD2D7}" type="datetime1">
               <a:rPr lang="en-GB" smtClean="0"/>
-              <a:t>16/02/2025</a:t>
+              <a:t>18/02/2025</a:t>
             </a:fld>
             <a:endParaRPr lang="en-GB"/>
           </a:p>
@@ -1194,7 +1210,15 @@
             <p:ph type="ftr" sz="quarter" idx="11"/>
           </p:nvPr>
         </p:nvSpPr>
-        <p:spPr/>
+        <p:spPr>
+          <a:xfrm>
+            <a:off x="4038600" y="6356350"/>
+            <a:ext cx="4114800" cy="365125"/>
+          </a:xfrm>
+          <a:prstGeom prst="rect">
+            <a:avLst/>
+          </a:prstGeom>
+        </p:spPr>
         <p:txBody>
           <a:bodyPr/>
           <a:lstStyle/>
@@ -1373,9 +1397,9 @@
           <a:bodyPr/>
           <a:lstStyle/>
           <a:p>
-            <a:fld id="{C7530781-7069-4C52-9986-F4D7100F7F0E}" type="datetime1">
+            <a:fld id="{3C343028-6D6B-4E0A-BEC8-C791F11CE273}" type="datetime1">
               <a:rPr lang="en-GB" smtClean="0"/>
-              <a:t>16/02/2025</a:t>
+              <a:t>18/02/2025</a:t>
             </a:fld>
             <a:endParaRPr lang="en-GB"/>
           </a:p>
@@ -1397,7 +1421,15 @@
             <p:ph type="ftr" sz="quarter" idx="11"/>
           </p:nvPr>
         </p:nvSpPr>
-        <p:spPr/>
+        <p:spPr>
+          <a:xfrm>
+            <a:off x="4038600" y="6356350"/>
+            <a:ext cx="4114800" cy="365125"/>
+          </a:xfrm>
+          <a:prstGeom prst="rect">
+            <a:avLst/>
+          </a:prstGeom>
+        </p:spPr>
         <p:txBody>
           <a:bodyPr/>
           <a:lstStyle/>
@@ -1652,9 +1684,9 @@
           <a:bodyPr/>
           <a:lstStyle/>
           <a:p>
-            <a:fld id="{18362A19-9A1F-4D71-9631-1743592D9CF5}" type="datetime1">
+            <a:fld id="{DCDC14A7-1EE6-4FCD-8073-C6A308CCCF3E}" type="datetime1">
               <a:rPr lang="en-GB" smtClean="0"/>
-              <a:t>16/02/2025</a:t>
+              <a:t>18/02/2025</a:t>
             </a:fld>
             <a:endParaRPr lang="en-GB"/>
           </a:p>
@@ -1676,7 +1708,15 @@
             <p:ph type="ftr" sz="quarter" idx="11"/>
           </p:nvPr>
         </p:nvSpPr>
-        <p:spPr/>
+        <p:spPr>
+          <a:xfrm>
+            <a:off x="4038600" y="6356350"/>
+            <a:ext cx="4114800" cy="365125"/>
+          </a:xfrm>
+          <a:prstGeom prst="rect">
+            <a:avLst/>
+          </a:prstGeom>
+        </p:spPr>
         <p:txBody>
           <a:bodyPr/>
           <a:lstStyle/>
@@ -1923,9 +1963,9 @@
           <a:bodyPr/>
           <a:lstStyle/>
           <a:p>
-            <a:fld id="{95F473B8-5AC4-4DB4-BF63-75C77EB95D97}" type="datetime1">
+            <a:fld id="{EDC59855-A66D-49EC-9AF7-4F1C3542A249}" type="datetime1">
               <a:rPr lang="en-GB" smtClean="0"/>
-              <a:t>16/02/2025</a:t>
+              <a:t>18/02/2025</a:t>
             </a:fld>
             <a:endParaRPr lang="en-GB"/>
           </a:p>
@@ -1947,7 +1987,15 @@
             <p:ph type="ftr" sz="quarter" idx="11"/>
           </p:nvPr>
         </p:nvSpPr>
-        <p:spPr/>
+        <p:spPr>
+          <a:xfrm>
+            <a:off x="4038600" y="6356350"/>
+            <a:ext cx="4114800" cy="365125"/>
+          </a:xfrm>
+          <a:prstGeom prst="rect">
+            <a:avLst/>
+          </a:prstGeom>
+        </p:spPr>
         <p:txBody>
           <a:bodyPr/>
           <a:lstStyle/>
@@ -2341,9 +2389,9 @@
           <a:bodyPr/>
           <a:lstStyle/>
           <a:p>
-            <a:fld id="{254B12B9-2309-4057-B81D-CA46F3B1DD5F}" type="datetime1">
+            <a:fld id="{7FF018C7-1FB8-47E9-831E-F9BA0344C205}" type="datetime1">
               <a:rPr lang="en-GB" smtClean="0"/>
-              <a:t>16/02/2025</a:t>
+              <a:t>18/02/2025</a:t>
             </a:fld>
             <a:endParaRPr lang="en-GB"/>
           </a:p>
@@ -2365,7 +2413,15 @@
             <p:ph type="ftr" sz="quarter" idx="11"/>
           </p:nvPr>
         </p:nvSpPr>
-        <p:spPr/>
+        <p:spPr>
+          <a:xfrm>
+            <a:off x="4038600" y="6356350"/>
+            <a:ext cx="4114800" cy="365125"/>
+          </a:xfrm>
+          <a:prstGeom prst="rect">
+            <a:avLst/>
+          </a:prstGeom>
+        </p:spPr>
         <p:txBody>
           <a:bodyPr/>
           <a:lstStyle/>
@@ -2486,9 +2542,9 @@
           <a:bodyPr/>
           <a:lstStyle/>
           <a:p>
-            <a:fld id="{F78640F9-3D13-4BC4-83DB-96828BA6AB04}" type="datetime1">
+            <a:fld id="{DE9C13CB-7100-4C1D-85EB-15B0D496214B}" type="datetime1">
               <a:rPr lang="en-GB" smtClean="0"/>
-              <a:t>16/02/2025</a:t>
+              <a:t>18/02/2025</a:t>
             </a:fld>
             <a:endParaRPr lang="en-GB"/>
           </a:p>
@@ -2510,7 +2566,15 @@
             <p:ph type="ftr" sz="quarter" idx="11"/>
           </p:nvPr>
         </p:nvSpPr>
-        <p:spPr/>
+        <p:spPr>
+          <a:xfrm>
+            <a:off x="4038600" y="6356350"/>
+            <a:ext cx="4114800" cy="365125"/>
+          </a:xfrm>
+          <a:prstGeom prst="rect">
+            <a:avLst/>
+          </a:prstGeom>
+        </p:spPr>
         <p:txBody>
           <a:bodyPr/>
           <a:lstStyle/>
@@ -2602,9 +2666,9 @@
           <a:bodyPr/>
           <a:lstStyle/>
           <a:p>
-            <a:fld id="{B4D19B2E-394C-480C-86ED-9B91ABAD25AC}" type="datetime1">
+            <a:fld id="{15A0B1CF-962F-4E59-962B-6E0AA44877C9}" type="datetime1">
               <a:rPr lang="en-GB" smtClean="0"/>
-              <a:t>16/02/2025</a:t>
+              <a:t>18/02/2025</a:t>
             </a:fld>
             <a:endParaRPr lang="en-GB"/>
           </a:p>
@@ -2626,7 +2690,15 @@
             <p:ph type="ftr" sz="quarter" idx="11"/>
           </p:nvPr>
         </p:nvSpPr>
-        <p:spPr/>
+        <p:spPr>
+          <a:xfrm>
+            <a:off x="4038600" y="6356350"/>
+            <a:ext cx="4114800" cy="365125"/>
+          </a:xfrm>
+          <a:prstGeom prst="rect">
+            <a:avLst/>
+          </a:prstGeom>
+        </p:spPr>
         <p:txBody>
           <a:bodyPr/>
           <a:lstStyle/>
@@ -2918,9 +2990,9 @@
           <a:bodyPr/>
           <a:lstStyle/>
           <a:p>
-            <a:fld id="{583B7A03-4E2B-4644-8CA7-7F32E17E3A18}" type="datetime1">
+            <a:fld id="{11D3292C-D646-4450-9AD5-ABF8FDC2AE0A}" type="datetime1">
               <a:rPr lang="en-GB" smtClean="0"/>
-              <a:t>16/02/2025</a:t>
+              <a:t>18/02/2025</a:t>
             </a:fld>
             <a:endParaRPr lang="en-GB"/>
           </a:p>
@@ -2942,7 +3014,15 @@
             <p:ph type="ftr" sz="quarter" idx="11"/>
           </p:nvPr>
         </p:nvSpPr>
-        <p:spPr/>
+        <p:spPr>
+          <a:xfrm>
+            <a:off x="4038600" y="6356350"/>
+            <a:ext cx="4114800" cy="365125"/>
+          </a:xfrm>
+          <a:prstGeom prst="rect">
+            <a:avLst/>
+          </a:prstGeom>
+        </p:spPr>
         <p:txBody>
           <a:bodyPr/>
           <a:lstStyle/>
@@ -3210,9 +3290,9 @@
           <a:bodyPr/>
           <a:lstStyle/>
           <a:p>
-            <a:fld id="{C36929F3-B695-4E96-ABBD-EDF866E67F58}" type="datetime1">
+            <a:fld id="{D1044925-AAAF-49B0-8EB4-ECCEE0469E33}" type="datetime1">
               <a:rPr lang="en-GB" smtClean="0"/>
-              <a:t>16/02/2025</a:t>
+              <a:t>18/02/2025</a:t>
             </a:fld>
             <a:endParaRPr lang="en-GB"/>
           </a:p>
@@ -3234,7 +3314,15 @@
             <p:ph type="ftr" sz="quarter" idx="11"/>
           </p:nvPr>
         </p:nvSpPr>
-        <p:spPr/>
+        <p:spPr>
+          <a:xfrm>
+            <a:off x="4038600" y="6356350"/>
+            <a:ext cx="4114800" cy="365125"/>
+          </a:xfrm>
+          <a:prstGeom prst="rect">
+            <a:avLst/>
+          </a:prstGeom>
+        </p:spPr>
         <p:txBody>
           <a:bodyPr/>
           <a:lstStyle/>
@@ -3593,117 +3681,11 @@
             </a:lvl1pPr>
           </a:lstStyle>
           <a:p>
-            <a:fld id="{DF41F9BA-D93D-4DD6-9C37-6FF4EB5FFAAC}" type="datetime1">
+            <a:fld id="{15559BF2-E747-40AA-A803-1963B20D9B32}" type="datetime1">
               <a:rPr lang="en-GB" smtClean="0"/>
-              <a:t>16/02/2025</a:t>
+              <a:t>18/02/2025</a:t>
             </a:fld>
             <a:endParaRPr lang="en-GB"/>
-          </a:p>
-        </p:txBody>
-      </p:sp>
-      <p:sp>
-        <p:nvSpPr>
-          <p:cNvPr id="8" name="Rectangle 7">
-            <a:extLst>
-              <a:ext uri="{FF2B5EF4-FFF2-40B4-BE49-F238E27FC236}">
-                <a16:creationId xmlns:a16="http://schemas.microsoft.com/office/drawing/2014/main" id="{09049983-6753-D429-E420-0F613427551F}"/>
-              </a:ext>
-            </a:extLst>
-          </p:cNvPr>
-          <p:cNvSpPr/>
-          <p:nvPr userDrawn="1"/>
-        </p:nvSpPr>
-        <p:spPr>
-          <a:xfrm>
-            <a:off x="4038600" y="6329454"/>
-            <a:ext cx="4114800" cy="365125"/>
-          </a:xfrm>
-          <a:prstGeom prst="rect">
-            <a:avLst/>
-          </a:prstGeom>
-          <a:solidFill>
-            <a:schemeClr val="accent2">
-              <a:lumMod val="20000"/>
-              <a:lumOff val="80000"/>
-            </a:schemeClr>
-          </a:solidFill>
-          <a:ln>
-            <a:solidFill>
-              <a:schemeClr val="accent1">
-                <a:lumMod val="75000"/>
-                <a:lumOff val="25000"/>
-              </a:schemeClr>
-            </a:solidFill>
-          </a:ln>
-        </p:spPr>
-        <p:style>
-          <a:lnRef idx="2">
-            <a:schemeClr val="accent4">
-              <a:shade val="15000"/>
-            </a:schemeClr>
-          </a:lnRef>
-          <a:fillRef idx="1">
-            <a:schemeClr val="accent4"/>
-          </a:fillRef>
-          <a:effectRef idx="0">
-            <a:schemeClr val="accent4"/>
-          </a:effectRef>
-          <a:fontRef idx="minor">
-            <a:schemeClr val="lt1"/>
-          </a:fontRef>
-        </p:style>
-        <p:txBody>
-          <a:bodyPr rtlCol="0" anchor="ctr"/>
-          <a:lstStyle/>
-          <a:p>
-            <a:pPr algn="ctr"/>
-            <a:endParaRPr lang="en-GB"/>
-          </a:p>
-        </p:txBody>
-      </p:sp>
-      <p:sp>
-        <p:nvSpPr>
-          <p:cNvPr id="5" name="Footer Placeholder 4">
-            <a:extLst>
-              <a:ext uri="{FF2B5EF4-FFF2-40B4-BE49-F238E27FC236}">
-                <a16:creationId xmlns:a16="http://schemas.microsoft.com/office/drawing/2014/main" id="{BBFA211E-0F76-F480-93DD-ED5DE440C9AB}"/>
-              </a:ext>
-            </a:extLst>
-          </p:cNvPr>
-          <p:cNvSpPr>
-            <a:spLocks noGrp="1"/>
-          </p:cNvSpPr>
-          <p:nvPr>
-            <p:ph type="ftr" sz="quarter" idx="3"/>
-          </p:nvPr>
-        </p:nvSpPr>
-        <p:spPr>
-          <a:xfrm>
-            <a:off x="4038600" y="6356350"/>
-            <a:ext cx="4114800" cy="365125"/>
-          </a:xfrm>
-          <a:prstGeom prst="rect">
-            <a:avLst/>
-          </a:prstGeom>
-        </p:spPr>
-        <p:txBody>
-          <a:bodyPr vert="horz" lIns="91440" tIns="45720" rIns="91440" bIns="45720" rtlCol="0" anchor="ctr"/>
-          <a:lstStyle>
-            <a:lvl1pPr algn="ctr">
-              <a:defRPr sz="1200">
-                <a:solidFill>
-                  <a:schemeClr val="tx1">
-                    <a:tint val="82000"/>
-                  </a:schemeClr>
-                </a:solidFill>
-              </a:defRPr>
-            </a:lvl1pPr>
-          </a:lstStyle>
-          <a:p>
-            <a:r>
-              <a:rPr lang="en-GB"/>
-              <a:t>SAMPLE TEXT</a:t>
-            </a:r>
           </a:p>
         </p:txBody>
       </p:sp>
@@ -3832,7 +3814,7 @@
     <p:sldLayoutId id="2147483658" r:id="rId10"/>
     <p:sldLayoutId id="2147483659" r:id="rId11"/>
   </p:sldLayoutIdLst>
-  <p:hf hdr="0" dt="0"/>
+  <p:hf hdr="0" ftr="0" dt="0"/>
   <p:txStyles>
     <p:titleStyle>
       <a:lvl1pPr algn="l" defTabSz="914400" rtl="0" eaLnBrk="1" latinLnBrk="0" hangingPunct="1">
@@ -4147,7 +4129,7 @@
         </p:nvSpPr>
         <p:spPr>
           <a:xfrm>
-            <a:off x="0" y="13448"/>
+            <a:off x="0" y="0"/>
             <a:ext cx="12192000" cy="6858000"/>
           </a:xfrm>
           <a:prstGeom prst="rect">
@@ -4238,7 +4220,7 @@
         </p:blipFill>
         <p:spPr>
           <a:xfrm>
-            <a:off x="3851197" y="1724491"/>
+            <a:off x="3899096" y="1724491"/>
             <a:ext cx="4393809" cy="3199375"/>
           </a:xfrm>
           <a:prstGeom prst="rect">
@@ -4300,7 +4282,7 @@
         </p:nvSpPr>
         <p:spPr>
           <a:xfrm>
-            <a:off x="2773680" y="0"/>
+            <a:off x="2821578" y="0"/>
             <a:ext cx="6548844" cy="1589746"/>
           </a:xfrm>
         </p:spPr>
@@ -4404,7 +4386,7 @@
         </p:nvSpPr>
         <p:spPr>
           <a:xfrm>
-            <a:off x="0" y="39193"/>
+            <a:off x="0" y="6490905"/>
             <a:ext cx="2708366" cy="369332"/>
           </a:xfrm>
           <a:prstGeom prst="rect">
@@ -4429,34 +4411,6 @@
               <a:t>RSPB website</a:t>
             </a:r>
             <a:endParaRPr lang="en-GB" dirty="0"/>
-          </a:p>
-        </p:txBody>
-      </p:sp>
-      <p:sp>
-        <p:nvSpPr>
-          <p:cNvPr id="4" name="Footer Placeholder 3">
-            <a:extLst>
-              <a:ext uri="{FF2B5EF4-FFF2-40B4-BE49-F238E27FC236}">
-                <a16:creationId xmlns:a16="http://schemas.microsoft.com/office/drawing/2014/main" id="{B68BA9E7-B9C4-B239-BCA3-3E58FFC0A147}"/>
-              </a:ext>
-            </a:extLst>
-          </p:cNvPr>
-          <p:cNvSpPr>
-            <a:spLocks noGrp="1"/>
-          </p:cNvSpPr>
-          <p:nvPr>
-            <p:ph type="ftr" sz="quarter" idx="11"/>
-          </p:nvPr>
-        </p:nvSpPr>
-        <p:spPr/>
-        <p:txBody>
-          <a:bodyPr/>
-          <a:lstStyle/>
-          <a:p>
-            <a:r>
-              <a:rPr lang="en-GB" dirty="0"/>
-              <a:t>SAMPLE TEXT</a:t>
-            </a:r>
           </a:p>
         </p:txBody>
       </p:sp>
@@ -4667,34 +4621,6 @@
       </p:sp>
       <p:sp>
         <p:nvSpPr>
-          <p:cNvPr id="4" name="Footer Placeholder 3">
-            <a:extLst>
-              <a:ext uri="{FF2B5EF4-FFF2-40B4-BE49-F238E27FC236}">
-                <a16:creationId xmlns:a16="http://schemas.microsoft.com/office/drawing/2014/main" id="{C130F5B2-54E4-6859-8042-3F434A766DB8}"/>
-              </a:ext>
-            </a:extLst>
-          </p:cNvPr>
-          <p:cNvSpPr>
-            <a:spLocks noGrp="1"/>
-          </p:cNvSpPr>
-          <p:nvPr>
-            <p:ph type="ftr" sz="quarter" idx="11"/>
-          </p:nvPr>
-        </p:nvSpPr>
-        <p:spPr/>
-        <p:txBody>
-          <a:bodyPr/>
-          <a:lstStyle/>
-          <a:p>
-            <a:r>
-              <a:rPr lang="en-GB"/>
-              <a:t>SAMPLE TEXT</a:t>
-            </a:r>
-          </a:p>
-        </p:txBody>
-      </p:sp>
-      <p:sp>
-        <p:nvSpPr>
           <p:cNvPr id="5" name="Slide Number Placeholder 4">
             <a:extLst>
               <a:ext uri="{FF2B5EF4-FFF2-40B4-BE49-F238E27FC236}">
@@ -4770,8 +4696,8 @@
         </p:nvSpPr>
         <p:spPr>
           <a:xfrm>
-            <a:off x="207170" y="136525"/>
-            <a:ext cx="5888830" cy="1468811"/>
+            <a:off x="207169" y="136525"/>
+            <a:ext cx="5986461" cy="1468811"/>
           </a:xfrm>
         </p:spPr>
         <p:txBody>
@@ -4838,7 +4764,7 @@
           <a:p>
             <a:r>
               <a:rPr lang="en-GB" dirty="0"/>
-              <a:t>[something about globalisation and trying to understand it’s effects on wildlife]</a:t>
+              <a:t>[something about globalisation and trying to understand their effects on wildlife]</a:t>
             </a:r>
           </a:p>
           <a:p>
@@ -4860,7 +4786,7 @@
         </p:nvSpPr>
         <p:spPr>
           <a:xfrm>
-            <a:off x="8225182" y="221877"/>
+            <a:off x="8153400" y="184944"/>
             <a:ext cx="3664131" cy="6118411"/>
           </a:xfrm>
           <a:prstGeom prst="rect">
@@ -4888,35 +4814,7 @@
             <a:pPr algn="ctr"/>
             <a:r>
               <a:rPr lang="en-GB" dirty="0"/>
-              <a:t>ID leaflet?</a:t>
-            </a:r>
-          </a:p>
-        </p:txBody>
-      </p:sp>
-      <p:sp>
-        <p:nvSpPr>
-          <p:cNvPr id="5" name="Footer Placeholder 4">
-            <a:extLst>
-              <a:ext uri="{FF2B5EF4-FFF2-40B4-BE49-F238E27FC236}">
-                <a16:creationId xmlns:a16="http://schemas.microsoft.com/office/drawing/2014/main" id="{8A05582E-628B-69FE-C1E7-8D9DEBE6BA87}"/>
-              </a:ext>
-            </a:extLst>
-          </p:cNvPr>
-          <p:cNvSpPr>
-            <a:spLocks noGrp="1"/>
-          </p:cNvSpPr>
-          <p:nvPr>
-            <p:ph type="ftr" sz="quarter" idx="11"/>
-          </p:nvPr>
-        </p:nvSpPr>
-        <p:spPr/>
-        <p:txBody>
-          <a:bodyPr/>
-          <a:lstStyle/>
-          <a:p>
-            <a:r>
-              <a:rPr lang="en-GB"/>
-              <a:t>SAMPLE TEXT</a:t>
+              <a:t>Image or something to go here</a:t>
             </a:r>
           </a:p>
         </p:txBody>
@@ -5098,34 +4996,6 @@
       </p:sp>
       <p:sp>
         <p:nvSpPr>
-          <p:cNvPr id="4" name="Footer Placeholder 3">
-            <a:extLst>
-              <a:ext uri="{FF2B5EF4-FFF2-40B4-BE49-F238E27FC236}">
-                <a16:creationId xmlns:a16="http://schemas.microsoft.com/office/drawing/2014/main" id="{FE11DD38-BE42-99C8-A5EB-52817368A2F4}"/>
-              </a:ext>
-            </a:extLst>
-          </p:cNvPr>
-          <p:cNvSpPr>
-            <a:spLocks noGrp="1"/>
-          </p:cNvSpPr>
-          <p:nvPr>
-            <p:ph type="ftr" sz="quarter" idx="11"/>
-          </p:nvPr>
-        </p:nvSpPr>
-        <p:spPr/>
-        <p:txBody>
-          <a:bodyPr/>
-          <a:lstStyle/>
-          <a:p>
-            <a:r>
-              <a:rPr lang="en-GB" dirty="0"/>
-              <a:t>SAMPLE TEXT</a:t>
-            </a:r>
-          </a:p>
-        </p:txBody>
-      </p:sp>
-      <p:sp>
-        <p:nvSpPr>
           <p:cNvPr id="5" name="Slide Number Placeholder 4">
             <a:extLst>
               <a:ext uri="{FF2B5EF4-FFF2-40B4-BE49-F238E27FC236}">
@@ -5348,34 +5218,6 @@
       </p:sp>
       <p:sp>
         <p:nvSpPr>
-          <p:cNvPr id="5" name="Footer Placeholder 4">
-            <a:extLst>
-              <a:ext uri="{FF2B5EF4-FFF2-40B4-BE49-F238E27FC236}">
-                <a16:creationId xmlns:a16="http://schemas.microsoft.com/office/drawing/2014/main" id="{0E567B9D-7B2D-B663-71CD-51F76BFEE787}"/>
-              </a:ext>
-            </a:extLst>
-          </p:cNvPr>
-          <p:cNvSpPr>
-            <a:spLocks noGrp="1"/>
-          </p:cNvSpPr>
-          <p:nvPr>
-            <p:ph type="ftr" sz="quarter" idx="11"/>
-          </p:nvPr>
-        </p:nvSpPr>
-        <p:spPr/>
-        <p:txBody>
-          <a:bodyPr/>
-          <a:lstStyle/>
-          <a:p>
-            <a:r>
-              <a:rPr lang="en-GB"/>
-              <a:t>SAMPLE TEXT</a:t>
-            </a:r>
-          </a:p>
-        </p:txBody>
-      </p:sp>
-      <p:sp>
-        <p:nvSpPr>
           <p:cNvPr id="6" name="Slide Number Placeholder 5">
             <a:extLst>
               <a:ext uri="{FF2B5EF4-FFF2-40B4-BE49-F238E27FC236}">
@@ -5617,40 +5459,7 @@
             </a:r>
             <a:r>
               <a:rPr lang="en-GB" dirty="0"/>
-              <a:t> </a:t>
-            </a:r>
-            <a:r>
-              <a:rPr lang="en-GB"/>
-              <a:t>hear </a:t>
-            </a:r>
-            <a:endParaRPr lang="en-GB" dirty="0"/>
-          </a:p>
-        </p:txBody>
-      </p:sp>
-      <p:sp>
-        <p:nvSpPr>
-          <p:cNvPr id="5" name="Footer Placeholder 4">
-            <a:extLst>
-              <a:ext uri="{FF2B5EF4-FFF2-40B4-BE49-F238E27FC236}">
-                <a16:creationId xmlns:a16="http://schemas.microsoft.com/office/drawing/2014/main" id="{B8E9CED4-E78E-51DC-5013-11F39FA55CF9}"/>
-              </a:ext>
-            </a:extLst>
-          </p:cNvPr>
-          <p:cNvSpPr>
-            <a:spLocks noGrp="1"/>
-          </p:cNvSpPr>
-          <p:nvPr>
-            <p:ph type="ftr" sz="quarter" idx="11"/>
-          </p:nvPr>
-        </p:nvSpPr>
-        <p:spPr/>
-        <p:txBody>
-          <a:bodyPr/>
-          <a:lstStyle/>
-          <a:p>
-            <a:r>
-              <a:rPr lang="en-GB"/>
-              <a:t>SAMPLE TEXT</a:t>
+              <a:t> hear </a:t>
             </a:r>
           </a:p>
         </p:txBody>
@@ -6241,34 +6050,6 @@
       </p:sp>
       <p:sp>
         <p:nvSpPr>
-          <p:cNvPr id="4" name="Footer Placeholder 3">
-            <a:extLst>
-              <a:ext uri="{FF2B5EF4-FFF2-40B4-BE49-F238E27FC236}">
-                <a16:creationId xmlns:a16="http://schemas.microsoft.com/office/drawing/2014/main" id="{26E0F0FD-FFF5-1FA8-D236-24DAA64EE1D5}"/>
-              </a:ext>
-            </a:extLst>
-          </p:cNvPr>
-          <p:cNvSpPr>
-            <a:spLocks noGrp="1"/>
-          </p:cNvSpPr>
-          <p:nvPr>
-            <p:ph type="ftr" sz="quarter" idx="11"/>
-          </p:nvPr>
-        </p:nvSpPr>
-        <p:spPr/>
-        <p:txBody>
-          <a:bodyPr/>
-          <a:lstStyle/>
-          <a:p>
-            <a:r>
-              <a:rPr lang="en-GB"/>
-              <a:t>SAMPLE TEXT</a:t>
-            </a:r>
-          </a:p>
-        </p:txBody>
-      </p:sp>
-      <p:sp>
-        <p:nvSpPr>
           <p:cNvPr id="7" name="Slide Number Placeholder 6">
             <a:extLst>
               <a:ext uri="{FF2B5EF4-FFF2-40B4-BE49-F238E27FC236}">
@@ -6403,34 +6184,6 @@
       </p:sp>
       <p:sp>
         <p:nvSpPr>
-          <p:cNvPr id="4" name="Footer Placeholder 3">
-            <a:extLst>
-              <a:ext uri="{FF2B5EF4-FFF2-40B4-BE49-F238E27FC236}">
-                <a16:creationId xmlns:a16="http://schemas.microsoft.com/office/drawing/2014/main" id="{20CDCF60-BB62-D385-B4E1-3F3B51C94DBB}"/>
-              </a:ext>
-            </a:extLst>
-          </p:cNvPr>
-          <p:cNvSpPr>
-            <a:spLocks noGrp="1"/>
-          </p:cNvSpPr>
-          <p:nvPr>
-            <p:ph type="ftr" sz="quarter" idx="11"/>
-          </p:nvPr>
-        </p:nvSpPr>
-        <p:spPr/>
-        <p:txBody>
-          <a:bodyPr/>
-          <a:lstStyle/>
-          <a:p>
-            <a:r>
-              <a:rPr lang="en-GB"/>
-              <a:t>SAMPLE TEXT</a:t>
-            </a:r>
-          </a:p>
-        </p:txBody>
-      </p:sp>
-      <p:sp>
-        <p:nvSpPr>
           <p:cNvPr id="5" name="Slide Number Placeholder 4">
             <a:extLst>
               <a:ext uri="{FF2B5EF4-FFF2-40B4-BE49-F238E27FC236}">
@@ -6616,34 +6369,6 @@
       </p:sp>
       <p:sp>
         <p:nvSpPr>
-          <p:cNvPr id="5" name="Footer Placeholder 4">
-            <a:extLst>
-              <a:ext uri="{FF2B5EF4-FFF2-40B4-BE49-F238E27FC236}">
-                <a16:creationId xmlns:a16="http://schemas.microsoft.com/office/drawing/2014/main" id="{654E02DD-41C7-75CC-9753-76D1AE031B6C}"/>
-              </a:ext>
-            </a:extLst>
-          </p:cNvPr>
-          <p:cNvSpPr>
-            <a:spLocks noGrp="1"/>
-          </p:cNvSpPr>
-          <p:nvPr>
-            <p:ph type="ftr" sz="quarter" idx="11"/>
-          </p:nvPr>
-        </p:nvSpPr>
-        <p:spPr/>
-        <p:txBody>
-          <a:bodyPr/>
-          <a:lstStyle/>
-          <a:p>
-            <a:r>
-              <a:rPr lang="en-GB"/>
-              <a:t>SAMPLE TEXT</a:t>
-            </a:r>
-          </a:p>
-        </p:txBody>
-      </p:sp>
-      <p:sp>
-        <p:nvSpPr>
           <p:cNvPr id="6" name="Slide Number Placeholder 5">
             <a:extLst>
               <a:ext uri="{FF2B5EF4-FFF2-40B4-BE49-F238E27FC236}">
@@ -6764,34 +6489,6 @@
               <a:t>{?} </a:t>
             </a:r>
             <a:endParaRPr lang="en-GB" dirty="0"/>
-          </a:p>
-        </p:txBody>
-      </p:sp>
-      <p:sp>
-        <p:nvSpPr>
-          <p:cNvPr id="4" name="Footer Placeholder 3">
-            <a:extLst>
-              <a:ext uri="{FF2B5EF4-FFF2-40B4-BE49-F238E27FC236}">
-                <a16:creationId xmlns:a16="http://schemas.microsoft.com/office/drawing/2014/main" id="{E99D3D22-1051-686E-7119-7570BD147AB2}"/>
-              </a:ext>
-            </a:extLst>
-          </p:cNvPr>
-          <p:cNvSpPr>
-            <a:spLocks noGrp="1"/>
-          </p:cNvSpPr>
-          <p:nvPr>
-            <p:ph type="ftr" sz="quarter" idx="11"/>
-          </p:nvPr>
-        </p:nvSpPr>
-        <p:spPr/>
-        <p:txBody>
-          <a:bodyPr/>
-          <a:lstStyle/>
-          <a:p>
-            <a:r>
-              <a:rPr lang="en-GB"/>
-              <a:t>SAMPLE TEXT</a:t>
-            </a:r>
           </a:p>
         </p:txBody>
       </p:sp>

</xml_diff>